<commit_message>
Anex & virtualEnv example added
</commit_message>
<xml_diff>
--- a/docs/Python for TD Workshop - ROTOR.pptx
+++ b/docs/Python for TD Workshop - ROTOR.pptx
@@ -11,6 +11,24 @@
     <p:sldId id="259" r:id="rId5"/>
     <p:sldId id="260" r:id="rId6"/>
     <p:sldId id="261" r:id="rId7"/>
+    <p:sldId id="262" r:id="rId8"/>
+    <p:sldId id="263" r:id="rId9"/>
+    <p:sldId id="264" r:id="rId10"/>
+    <p:sldId id="265" r:id="rId11"/>
+    <p:sldId id="266" r:id="rId12"/>
+    <p:sldId id="267" r:id="rId13"/>
+    <p:sldId id="268" r:id="rId14"/>
+    <p:sldId id="269" r:id="rId15"/>
+    <p:sldId id="270" r:id="rId16"/>
+    <p:sldId id="271" r:id="rId17"/>
+    <p:sldId id="272" r:id="rId18"/>
+    <p:sldId id="273" r:id="rId19"/>
+    <p:sldId id="274" r:id="rId20"/>
+    <p:sldId id="275" r:id="rId21"/>
+    <p:sldId id="279" r:id="rId22"/>
+    <p:sldId id="276" r:id="rId23"/>
+    <p:sldId id="277" r:id="rId24"/>
+    <p:sldId id="278" r:id="rId25"/>
   </p:sldIdLst>
   <p:sldSz cx="9144000" cy="6858000" type="screen4x3"/>
   <p:notesSz cx="6858000" cy="9144000"/>
@@ -3136,6 +3154,819 @@
 </p:sld>
 </file>
 
+<file path=ppt/slides/slide10.xml><?xml version="1.0" encoding="utf-8"?>
+<p:sld xmlns:a="http://schemas.openxmlformats.org/drawingml/2006/main" xmlns:r="http://schemas.openxmlformats.org/officeDocument/2006/relationships" xmlns:p="http://schemas.openxmlformats.org/presentationml/2006/main">
+  <p:cSld>
+    <p:spTree>
+      <p:nvGrpSpPr>
+        <p:cNvPr id="1" name=""/>
+        <p:cNvGrpSpPr/>
+        <p:nvPr/>
+      </p:nvGrpSpPr>
+      <p:grpSpPr>
+        <a:xfrm>
+          <a:off x="0" y="0"/>
+          <a:ext cx="0" cy="0"/>
+          <a:chOff x="0" y="0"/>
+          <a:chExt cx="0" cy="0"/>
+        </a:xfrm>
+      </p:grpSpPr>
+      <p:sp>
+        <p:nvSpPr>
+          <p:cNvPr id="2" name="1 Título"/>
+          <p:cNvSpPr>
+            <a:spLocks noGrp="1"/>
+          </p:cNvSpPr>
+          <p:nvPr>
+            <p:ph type="title"/>
+          </p:nvPr>
+        </p:nvSpPr>
+        <p:spPr/>
+        <p:txBody>
+          <a:bodyPr/>
+          <a:lstStyle/>
+          <a:p>
+            <a:r>
+              <a:rPr lang="es-ES" dirty="0" smtClean="0"/>
+              <a:t>Fundamentos de </a:t>
+            </a:r>
+            <a:r>
+              <a:rPr lang="es-ES" dirty="0" err="1" smtClean="0"/>
+              <a:t>Python</a:t>
+            </a:r>
+            <a:endParaRPr lang="es-ES" dirty="0"/>
+          </a:p>
+        </p:txBody>
+      </p:sp>
+      <p:sp>
+        <p:nvSpPr>
+          <p:cNvPr id="3" name="2 Marcador de contenido"/>
+          <p:cNvSpPr>
+            <a:spLocks noGrp="1"/>
+          </p:cNvSpPr>
+          <p:nvPr>
+            <p:ph idx="1"/>
+          </p:nvPr>
+        </p:nvSpPr>
+        <p:spPr/>
+        <p:txBody>
+          <a:bodyPr/>
+          <a:lstStyle/>
+          <a:p>
+            <a:r>
+              <a:rPr lang="es-ES" dirty="0" smtClean="0"/>
+              <a:t>Tipos básicos de datos.</a:t>
+            </a:r>
+            <a:endParaRPr lang="es-ES" dirty="0"/>
+          </a:p>
+        </p:txBody>
+      </p:sp>
+    </p:spTree>
+  </p:cSld>
+  <p:clrMapOvr>
+    <a:masterClrMapping/>
+  </p:clrMapOvr>
+</p:sld>
+</file>
+
+<file path=ppt/slides/slide11.xml><?xml version="1.0" encoding="utf-8"?>
+<p:sld xmlns:a="http://schemas.openxmlformats.org/drawingml/2006/main" xmlns:r="http://schemas.openxmlformats.org/officeDocument/2006/relationships" xmlns:p="http://schemas.openxmlformats.org/presentationml/2006/main">
+  <p:cSld>
+    <p:spTree>
+      <p:nvGrpSpPr>
+        <p:cNvPr id="1" name=""/>
+        <p:cNvGrpSpPr/>
+        <p:nvPr/>
+      </p:nvGrpSpPr>
+      <p:grpSpPr>
+        <a:xfrm>
+          <a:off x="0" y="0"/>
+          <a:ext cx="0" cy="0"/>
+          <a:chOff x="0" y="0"/>
+          <a:chExt cx="0" cy="0"/>
+        </a:xfrm>
+      </p:grpSpPr>
+      <p:sp>
+        <p:nvSpPr>
+          <p:cNvPr id="2" name="1 Título"/>
+          <p:cNvSpPr>
+            <a:spLocks noGrp="1"/>
+          </p:cNvSpPr>
+          <p:nvPr>
+            <p:ph type="title"/>
+          </p:nvPr>
+        </p:nvSpPr>
+        <p:spPr/>
+        <p:txBody>
+          <a:bodyPr/>
+          <a:lstStyle/>
+          <a:p>
+            <a:r>
+              <a:rPr lang="es-ES" dirty="0" smtClean="0"/>
+              <a:t>Fundamentos de </a:t>
+            </a:r>
+            <a:r>
+              <a:rPr lang="es-ES" dirty="0" err="1" smtClean="0"/>
+              <a:t>Python</a:t>
+            </a:r>
+            <a:endParaRPr lang="es-ES" dirty="0"/>
+          </a:p>
+        </p:txBody>
+      </p:sp>
+      <p:sp>
+        <p:nvSpPr>
+          <p:cNvPr id="3" name="2 Marcador de contenido"/>
+          <p:cNvSpPr>
+            <a:spLocks noGrp="1"/>
+          </p:cNvSpPr>
+          <p:nvPr>
+            <p:ph idx="1"/>
+          </p:nvPr>
+        </p:nvSpPr>
+        <p:spPr/>
+        <p:txBody>
+          <a:bodyPr/>
+          <a:lstStyle/>
+          <a:p>
+            <a:r>
+              <a:rPr lang="es-ES" dirty="0" smtClean="0"/>
+              <a:t>Funciones</a:t>
+            </a:r>
+            <a:endParaRPr lang="es-ES" dirty="0"/>
+          </a:p>
+        </p:txBody>
+      </p:sp>
+    </p:spTree>
+  </p:cSld>
+  <p:clrMapOvr>
+    <a:masterClrMapping/>
+  </p:clrMapOvr>
+</p:sld>
+</file>
+
+<file path=ppt/slides/slide12.xml><?xml version="1.0" encoding="utf-8"?>
+<p:sld xmlns:a="http://schemas.openxmlformats.org/drawingml/2006/main" xmlns:r="http://schemas.openxmlformats.org/officeDocument/2006/relationships" xmlns:p="http://schemas.openxmlformats.org/presentationml/2006/main">
+  <p:cSld>
+    <p:spTree>
+      <p:nvGrpSpPr>
+        <p:cNvPr id="1" name=""/>
+        <p:cNvGrpSpPr/>
+        <p:nvPr/>
+      </p:nvGrpSpPr>
+      <p:grpSpPr>
+        <a:xfrm>
+          <a:off x="0" y="0"/>
+          <a:ext cx="0" cy="0"/>
+          <a:chOff x="0" y="0"/>
+          <a:chExt cx="0" cy="0"/>
+        </a:xfrm>
+      </p:grpSpPr>
+      <p:sp>
+        <p:nvSpPr>
+          <p:cNvPr id="2" name="1 Título"/>
+          <p:cNvSpPr>
+            <a:spLocks noGrp="1"/>
+          </p:cNvSpPr>
+          <p:nvPr>
+            <p:ph type="title"/>
+          </p:nvPr>
+        </p:nvSpPr>
+        <p:spPr/>
+        <p:txBody>
+          <a:bodyPr/>
+          <a:lstStyle/>
+          <a:p>
+            <a:r>
+              <a:rPr lang="es-ES" dirty="0" smtClean="0"/>
+              <a:t>Fundamentos de </a:t>
+            </a:r>
+            <a:r>
+              <a:rPr lang="es-ES" dirty="0" err="1" smtClean="0"/>
+              <a:t>Python</a:t>
+            </a:r>
+            <a:endParaRPr lang="es-ES" dirty="0"/>
+          </a:p>
+        </p:txBody>
+      </p:sp>
+      <p:sp>
+        <p:nvSpPr>
+          <p:cNvPr id="3" name="2 Marcador de contenido"/>
+          <p:cNvSpPr>
+            <a:spLocks noGrp="1"/>
+          </p:cNvSpPr>
+          <p:nvPr>
+            <p:ph idx="1"/>
+          </p:nvPr>
+        </p:nvSpPr>
+        <p:spPr/>
+        <p:txBody>
+          <a:bodyPr/>
+          <a:lstStyle/>
+          <a:p>
+            <a:r>
+              <a:rPr lang="es-ES" dirty="0" err="1" smtClean="0"/>
+              <a:t>Iteradores</a:t>
+            </a:r>
+            <a:endParaRPr lang="es-ES" dirty="0"/>
+          </a:p>
+        </p:txBody>
+      </p:sp>
+    </p:spTree>
+  </p:cSld>
+  <p:clrMapOvr>
+    <a:masterClrMapping/>
+  </p:clrMapOvr>
+</p:sld>
+</file>
+
+<file path=ppt/slides/slide13.xml><?xml version="1.0" encoding="utf-8"?>
+<p:sld xmlns:a="http://schemas.openxmlformats.org/drawingml/2006/main" xmlns:r="http://schemas.openxmlformats.org/officeDocument/2006/relationships" xmlns:p="http://schemas.openxmlformats.org/presentationml/2006/main">
+  <p:cSld>
+    <p:spTree>
+      <p:nvGrpSpPr>
+        <p:cNvPr id="1" name=""/>
+        <p:cNvGrpSpPr/>
+        <p:nvPr/>
+      </p:nvGrpSpPr>
+      <p:grpSpPr>
+        <a:xfrm>
+          <a:off x="0" y="0"/>
+          <a:ext cx="0" cy="0"/>
+          <a:chOff x="0" y="0"/>
+          <a:chExt cx="0" cy="0"/>
+        </a:xfrm>
+      </p:grpSpPr>
+      <p:sp>
+        <p:nvSpPr>
+          <p:cNvPr id="2" name="1 Título"/>
+          <p:cNvSpPr>
+            <a:spLocks noGrp="1"/>
+          </p:cNvSpPr>
+          <p:nvPr>
+            <p:ph type="title"/>
+          </p:nvPr>
+        </p:nvSpPr>
+        <p:spPr/>
+        <p:txBody>
+          <a:bodyPr/>
+          <a:lstStyle/>
+          <a:p>
+            <a:r>
+              <a:rPr lang="es-ES" dirty="0" smtClean="0"/>
+              <a:t>Fundamentos de </a:t>
+            </a:r>
+            <a:r>
+              <a:rPr lang="es-ES" dirty="0" err="1" smtClean="0"/>
+              <a:t>Python</a:t>
+            </a:r>
+            <a:endParaRPr lang="es-ES" dirty="0"/>
+          </a:p>
+        </p:txBody>
+      </p:sp>
+      <p:sp>
+        <p:nvSpPr>
+          <p:cNvPr id="3" name="2 Marcador de contenido"/>
+          <p:cNvSpPr>
+            <a:spLocks noGrp="1"/>
+          </p:cNvSpPr>
+          <p:nvPr>
+            <p:ph idx="1"/>
+          </p:nvPr>
+        </p:nvSpPr>
+        <p:spPr/>
+        <p:txBody>
+          <a:bodyPr/>
+          <a:lstStyle/>
+          <a:p>
+            <a:r>
+              <a:rPr lang="es-ES" dirty="0" smtClean="0"/>
+              <a:t>Flujo de Programa</a:t>
+            </a:r>
+            <a:endParaRPr lang="es-ES" dirty="0"/>
+          </a:p>
+        </p:txBody>
+      </p:sp>
+    </p:spTree>
+  </p:cSld>
+  <p:clrMapOvr>
+    <a:masterClrMapping/>
+  </p:clrMapOvr>
+</p:sld>
+</file>
+
+<file path=ppt/slides/slide14.xml><?xml version="1.0" encoding="utf-8"?>
+<p:sld xmlns:a="http://schemas.openxmlformats.org/drawingml/2006/main" xmlns:r="http://schemas.openxmlformats.org/officeDocument/2006/relationships" xmlns:p="http://schemas.openxmlformats.org/presentationml/2006/main">
+  <p:cSld>
+    <p:spTree>
+      <p:nvGrpSpPr>
+        <p:cNvPr id="1" name=""/>
+        <p:cNvGrpSpPr/>
+        <p:nvPr/>
+      </p:nvGrpSpPr>
+      <p:grpSpPr>
+        <a:xfrm>
+          <a:off x="0" y="0"/>
+          <a:ext cx="0" cy="0"/>
+          <a:chOff x="0" y="0"/>
+          <a:chExt cx="0" cy="0"/>
+        </a:xfrm>
+      </p:grpSpPr>
+      <p:sp>
+        <p:nvSpPr>
+          <p:cNvPr id="2" name="1 Título"/>
+          <p:cNvSpPr>
+            <a:spLocks noGrp="1"/>
+          </p:cNvSpPr>
+          <p:nvPr>
+            <p:ph type="title"/>
+          </p:nvPr>
+        </p:nvSpPr>
+        <p:spPr/>
+        <p:txBody>
+          <a:bodyPr/>
+          <a:lstStyle/>
+          <a:p>
+            <a:r>
+              <a:rPr lang="es-ES" dirty="0" smtClean="0"/>
+              <a:t>Fundamentos de </a:t>
+            </a:r>
+            <a:r>
+              <a:rPr lang="es-ES" dirty="0" err="1" smtClean="0"/>
+              <a:t>Python</a:t>
+            </a:r>
+            <a:endParaRPr lang="es-ES" dirty="0"/>
+          </a:p>
+        </p:txBody>
+      </p:sp>
+      <p:sp>
+        <p:nvSpPr>
+          <p:cNvPr id="3" name="2 Marcador de contenido"/>
+          <p:cNvSpPr>
+            <a:spLocks noGrp="1"/>
+          </p:cNvSpPr>
+          <p:nvPr>
+            <p:ph idx="1"/>
+          </p:nvPr>
+        </p:nvSpPr>
+        <p:spPr/>
+        <p:txBody>
+          <a:bodyPr/>
+          <a:lstStyle/>
+          <a:p>
+            <a:r>
+              <a:rPr lang="es-ES" dirty="0" smtClean="0"/>
+              <a:t>Tipos especiales de datos: </a:t>
+            </a:r>
+          </a:p>
+          <a:p>
+            <a:pPr lvl="1"/>
+            <a:r>
+              <a:rPr lang="es-ES" dirty="0" smtClean="0"/>
+              <a:t>Listas</a:t>
+            </a:r>
+          </a:p>
+          <a:p>
+            <a:pPr lvl="1"/>
+            <a:r>
+              <a:rPr lang="es-ES" dirty="0" err="1" smtClean="0"/>
+              <a:t>Tuplas</a:t>
+            </a:r>
+            <a:endParaRPr lang="es-ES" dirty="0" smtClean="0"/>
+          </a:p>
+          <a:p>
+            <a:pPr lvl="1"/>
+            <a:r>
+              <a:rPr lang="es-ES" dirty="0" smtClean="0"/>
+              <a:t>Diccionarios</a:t>
+            </a:r>
+            <a:endParaRPr lang="es-ES" dirty="0"/>
+          </a:p>
+        </p:txBody>
+      </p:sp>
+    </p:spTree>
+  </p:cSld>
+  <p:clrMapOvr>
+    <a:masterClrMapping/>
+  </p:clrMapOvr>
+</p:sld>
+</file>
+
+<file path=ppt/slides/slide15.xml><?xml version="1.0" encoding="utf-8"?>
+<p:sld xmlns:a="http://schemas.openxmlformats.org/drawingml/2006/main" xmlns:r="http://schemas.openxmlformats.org/officeDocument/2006/relationships" xmlns:p="http://schemas.openxmlformats.org/presentationml/2006/main">
+  <p:cSld>
+    <p:spTree>
+      <p:nvGrpSpPr>
+        <p:cNvPr id="1" name=""/>
+        <p:cNvGrpSpPr/>
+        <p:nvPr/>
+      </p:nvGrpSpPr>
+      <p:grpSpPr>
+        <a:xfrm>
+          <a:off x="0" y="0"/>
+          <a:ext cx="0" cy="0"/>
+          <a:chOff x="0" y="0"/>
+          <a:chExt cx="0" cy="0"/>
+        </a:xfrm>
+      </p:grpSpPr>
+      <p:sp>
+        <p:nvSpPr>
+          <p:cNvPr id="2" name="1 Título"/>
+          <p:cNvSpPr>
+            <a:spLocks noGrp="1"/>
+          </p:cNvSpPr>
+          <p:nvPr>
+            <p:ph type="title"/>
+          </p:nvPr>
+        </p:nvSpPr>
+        <p:spPr/>
+        <p:txBody>
+          <a:bodyPr/>
+          <a:lstStyle/>
+          <a:p>
+            <a:r>
+              <a:rPr lang="es-ES" dirty="0" smtClean="0"/>
+              <a:t>Fundamentos de </a:t>
+            </a:r>
+            <a:r>
+              <a:rPr lang="es-ES" dirty="0" err="1" smtClean="0"/>
+              <a:t>Python</a:t>
+            </a:r>
+            <a:endParaRPr lang="es-ES" dirty="0"/>
+          </a:p>
+        </p:txBody>
+      </p:sp>
+      <p:sp>
+        <p:nvSpPr>
+          <p:cNvPr id="3" name="2 Marcador de contenido"/>
+          <p:cNvSpPr>
+            <a:spLocks noGrp="1"/>
+          </p:cNvSpPr>
+          <p:nvPr>
+            <p:ph idx="1"/>
+          </p:nvPr>
+        </p:nvSpPr>
+        <p:spPr/>
+        <p:txBody>
+          <a:bodyPr/>
+          <a:lstStyle/>
+          <a:p>
+            <a:r>
+              <a:rPr lang="es-ES" dirty="0" smtClean="0"/>
+              <a:t>Programación Orientada a Objetos: </a:t>
+            </a:r>
+          </a:p>
+          <a:p>
+            <a:pPr lvl="1"/>
+            <a:r>
+              <a:rPr lang="es-ES" dirty="0" smtClean="0"/>
+              <a:t>Clases</a:t>
+            </a:r>
+          </a:p>
+          <a:p>
+            <a:pPr lvl="1"/>
+            <a:r>
+              <a:rPr lang="es-ES" dirty="0" smtClean="0"/>
+              <a:t>Objetos</a:t>
+            </a:r>
+          </a:p>
+        </p:txBody>
+      </p:sp>
+    </p:spTree>
+  </p:cSld>
+  <p:clrMapOvr>
+    <a:masterClrMapping/>
+  </p:clrMapOvr>
+</p:sld>
+</file>
+
+<file path=ppt/slides/slide16.xml><?xml version="1.0" encoding="utf-8"?>
+<p:sld xmlns:a="http://schemas.openxmlformats.org/drawingml/2006/main" xmlns:r="http://schemas.openxmlformats.org/officeDocument/2006/relationships" xmlns:p="http://schemas.openxmlformats.org/presentationml/2006/main">
+  <p:cSld>
+    <p:spTree>
+      <p:nvGrpSpPr>
+        <p:cNvPr id="1" name=""/>
+        <p:cNvGrpSpPr/>
+        <p:nvPr/>
+      </p:nvGrpSpPr>
+      <p:grpSpPr>
+        <a:xfrm>
+          <a:off x="0" y="0"/>
+          <a:ext cx="0" cy="0"/>
+          <a:chOff x="0" y="0"/>
+          <a:chExt cx="0" cy="0"/>
+        </a:xfrm>
+      </p:grpSpPr>
+      <p:sp>
+        <p:nvSpPr>
+          <p:cNvPr id="2" name="1 Título"/>
+          <p:cNvSpPr>
+            <a:spLocks noGrp="1"/>
+          </p:cNvSpPr>
+          <p:nvPr>
+            <p:ph type="title"/>
+          </p:nvPr>
+        </p:nvSpPr>
+        <p:spPr/>
+        <p:txBody>
+          <a:bodyPr/>
+          <a:lstStyle/>
+          <a:p>
+            <a:r>
+              <a:rPr lang="es-ES" dirty="0" smtClean="0"/>
+              <a:t>Fundamentos de </a:t>
+            </a:r>
+            <a:r>
+              <a:rPr lang="es-ES" dirty="0" err="1" smtClean="0"/>
+              <a:t>Python</a:t>
+            </a:r>
+            <a:endParaRPr lang="es-ES" dirty="0"/>
+          </a:p>
+        </p:txBody>
+      </p:sp>
+      <p:sp>
+        <p:nvSpPr>
+          <p:cNvPr id="3" name="2 Marcador de contenido"/>
+          <p:cNvSpPr>
+            <a:spLocks noGrp="1"/>
+          </p:cNvSpPr>
+          <p:nvPr>
+            <p:ph idx="1"/>
+          </p:nvPr>
+        </p:nvSpPr>
+        <p:spPr/>
+        <p:txBody>
+          <a:bodyPr/>
+          <a:lstStyle/>
+          <a:p>
+            <a:r>
+              <a:rPr lang="es-ES" dirty="0" smtClean="0"/>
+              <a:t>Gestión de excepciones: </a:t>
+            </a:r>
+          </a:p>
+          <a:p>
+            <a:pPr lvl="1"/>
+            <a:r>
+              <a:rPr lang="es-ES" dirty="0" smtClean="0"/>
+              <a:t>Try/Catch</a:t>
+            </a:r>
+          </a:p>
+        </p:txBody>
+      </p:sp>
+    </p:spTree>
+  </p:cSld>
+  <p:clrMapOvr>
+    <a:masterClrMapping/>
+  </p:clrMapOvr>
+</p:sld>
+</file>
+
+<file path=ppt/slides/slide17.xml><?xml version="1.0" encoding="utf-8"?>
+<p:sld xmlns:a="http://schemas.openxmlformats.org/drawingml/2006/main" xmlns:r="http://schemas.openxmlformats.org/officeDocument/2006/relationships" xmlns:p="http://schemas.openxmlformats.org/presentationml/2006/main">
+  <p:cSld>
+    <p:spTree>
+      <p:nvGrpSpPr>
+        <p:cNvPr id="1" name=""/>
+        <p:cNvGrpSpPr/>
+        <p:nvPr/>
+      </p:nvGrpSpPr>
+      <p:grpSpPr>
+        <a:xfrm>
+          <a:off x="0" y="0"/>
+          <a:ext cx="0" cy="0"/>
+          <a:chOff x="0" y="0"/>
+          <a:chExt cx="0" cy="0"/>
+        </a:xfrm>
+      </p:grpSpPr>
+      <p:sp>
+        <p:nvSpPr>
+          <p:cNvPr id="2" name="1 Título"/>
+          <p:cNvSpPr>
+            <a:spLocks noGrp="1"/>
+          </p:cNvSpPr>
+          <p:nvPr>
+            <p:ph type="title"/>
+          </p:nvPr>
+        </p:nvSpPr>
+        <p:spPr/>
+        <p:txBody>
+          <a:bodyPr/>
+          <a:lstStyle/>
+          <a:p>
+            <a:r>
+              <a:rPr lang="es-ES" dirty="0" smtClean="0"/>
+              <a:t>Fundamentos de </a:t>
+            </a:r>
+            <a:r>
+              <a:rPr lang="es-ES" dirty="0" err="1" smtClean="0"/>
+              <a:t>Python</a:t>
+            </a:r>
+            <a:endParaRPr lang="es-ES" dirty="0"/>
+          </a:p>
+        </p:txBody>
+      </p:sp>
+      <p:sp>
+        <p:nvSpPr>
+          <p:cNvPr id="3" name="2 Marcador de contenido"/>
+          <p:cNvSpPr>
+            <a:spLocks noGrp="1"/>
+          </p:cNvSpPr>
+          <p:nvPr>
+            <p:ph idx="1"/>
+          </p:nvPr>
+        </p:nvSpPr>
+        <p:spPr/>
+        <p:txBody>
+          <a:bodyPr/>
+          <a:lstStyle/>
+          <a:p>
+            <a:r>
+              <a:rPr lang="es-ES" dirty="0" smtClean="0"/>
+              <a:t>Entrada/Salida de Archivos</a:t>
+            </a:r>
+          </a:p>
+          <a:p>
+            <a:pPr lvl="1"/>
+            <a:r>
+              <a:rPr lang="es-ES" dirty="0" smtClean="0"/>
+              <a:t>IO Module</a:t>
+            </a:r>
+          </a:p>
+        </p:txBody>
+      </p:sp>
+    </p:spTree>
+  </p:cSld>
+  <p:clrMapOvr>
+    <a:masterClrMapping/>
+  </p:clrMapOvr>
+</p:sld>
+</file>
+
+<file path=ppt/slides/slide18.xml><?xml version="1.0" encoding="utf-8"?>
+<p:sld xmlns:a="http://schemas.openxmlformats.org/drawingml/2006/main" xmlns:r="http://schemas.openxmlformats.org/officeDocument/2006/relationships" xmlns:p="http://schemas.openxmlformats.org/presentationml/2006/main">
+  <p:cSld>
+    <p:spTree>
+      <p:nvGrpSpPr>
+        <p:cNvPr id="1" name=""/>
+        <p:cNvGrpSpPr/>
+        <p:nvPr/>
+      </p:nvGrpSpPr>
+      <p:grpSpPr>
+        <a:xfrm>
+          <a:off x="0" y="0"/>
+          <a:ext cx="0" cy="0"/>
+          <a:chOff x="0" y="0"/>
+          <a:chExt cx="0" cy="0"/>
+        </a:xfrm>
+      </p:grpSpPr>
+      <p:sp>
+        <p:nvSpPr>
+          <p:cNvPr id="2" name="1 Título"/>
+          <p:cNvSpPr>
+            <a:spLocks noGrp="1"/>
+          </p:cNvSpPr>
+          <p:nvPr>
+            <p:ph type="title"/>
+          </p:nvPr>
+        </p:nvSpPr>
+        <p:spPr/>
+        <p:txBody>
+          <a:bodyPr/>
+          <a:lstStyle/>
+          <a:p>
+            <a:r>
+              <a:rPr lang="es-ES" dirty="0" smtClean="0"/>
+              <a:t>Módulos Externos</a:t>
+            </a:r>
+            <a:endParaRPr lang="es-ES" dirty="0"/>
+          </a:p>
+        </p:txBody>
+      </p:sp>
+      <p:sp>
+        <p:nvSpPr>
+          <p:cNvPr id="3" name="2 Marcador de contenido"/>
+          <p:cNvSpPr>
+            <a:spLocks noGrp="1"/>
+          </p:cNvSpPr>
+          <p:nvPr>
+            <p:ph idx="1"/>
+          </p:nvPr>
+        </p:nvSpPr>
+        <p:spPr/>
+        <p:txBody>
+          <a:bodyPr/>
+          <a:lstStyle/>
+          <a:p>
+            <a:r>
+              <a:rPr lang="es-ES" dirty="0" smtClean="0"/>
+              <a:t>Importar y usar módulos externos en </a:t>
+            </a:r>
+            <a:r>
+              <a:rPr lang="es-ES" dirty="0" err="1" smtClean="0"/>
+              <a:t>Python</a:t>
+            </a:r>
+            <a:r>
+              <a:rPr lang="es-ES" dirty="0" smtClean="0"/>
+              <a:t>.</a:t>
+            </a:r>
+          </a:p>
+        </p:txBody>
+      </p:sp>
+    </p:spTree>
+  </p:cSld>
+  <p:clrMapOvr>
+    <a:masterClrMapping/>
+  </p:clrMapOvr>
+</p:sld>
+</file>
+
+<file path=ppt/slides/slide19.xml><?xml version="1.0" encoding="utf-8"?>
+<p:sld xmlns:a="http://schemas.openxmlformats.org/drawingml/2006/main" xmlns:r="http://schemas.openxmlformats.org/officeDocument/2006/relationships" xmlns:p="http://schemas.openxmlformats.org/presentationml/2006/main">
+  <p:cSld>
+    <p:spTree>
+      <p:nvGrpSpPr>
+        <p:cNvPr id="1" name=""/>
+        <p:cNvGrpSpPr/>
+        <p:nvPr/>
+      </p:nvGrpSpPr>
+      <p:grpSpPr>
+        <a:xfrm>
+          <a:off x="0" y="0"/>
+          <a:ext cx="0" cy="0"/>
+          <a:chOff x="0" y="0"/>
+          <a:chExt cx="0" cy="0"/>
+        </a:xfrm>
+      </p:grpSpPr>
+      <p:sp>
+        <p:nvSpPr>
+          <p:cNvPr id="2" name="1 Título"/>
+          <p:cNvSpPr>
+            <a:spLocks noGrp="1"/>
+          </p:cNvSpPr>
+          <p:nvPr>
+            <p:ph type="title"/>
+          </p:nvPr>
+        </p:nvSpPr>
+        <p:spPr/>
+        <p:txBody>
+          <a:bodyPr/>
+          <a:lstStyle/>
+          <a:p>
+            <a:r>
+              <a:rPr lang="es-ES" dirty="0" smtClean="0"/>
+              <a:t>Mini Proyecto Final</a:t>
+            </a:r>
+            <a:endParaRPr lang="es-ES" dirty="0"/>
+          </a:p>
+        </p:txBody>
+      </p:sp>
+      <p:sp>
+        <p:nvSpPr>
+          <p:cNvPr id="3" name="2 Marcador de contenido"/>
+          <p:cNvSpPr>
+            <a:spLocks noGrp="1"/>
+          </p:cNvSpPr>
+          <p:nvPr>
+            <p:ph idx="1"/>
+          </p:nvPr>
+        </p:nvSpPr>
+        <p:spPr/>
+        <p:txBody>
+          <a:bodyPr/>
+          <a:lstStyle/>
+          <a:p>
+            <a:r>
+              <a:rPr lang="es-ES" dirty="0" smtClean="0"/>
+              <a:t>Requisitos</a:t>
+            </a:r>
+          </a:p>
+          <a:p>
+            <a:r>
+              <a:rPr lang="es-ES" dirty="0" smtClean="0"/>
+              <a:t>Resultados</a:t>
+            </a:r>
+          </a:p>
+          <a:p>
+            <a:r>
+              <a:rPr lang="es-ES" dirty="0" smtClean="0"/>
+              <a:t>Posibles ampliaciones</a:t>
+            </a:r>
+          </a:p>
+          <a:p>
+            <a:endParaRPr lang="es-ES" dirty="0" smtClean="0"/>
+          </a:p>
+          <a:p>
+            <a:endParaRPr lang="es-ES" dirty="0" smtClean="0"/>
+          </a:p>
+        </p:txBody>
+      </p:sp>
+    </p:spTree>
+  </p:cSld>
+  <p:clrMapOvr>
+    <a:masterClrMapping/>
+  </p:clrMapOvr>
+</p:sld>
+</file>
+
 <file path=ppt/slides/slide2.xml><?xml version="1.0" encoding="utf-8"?>
 <p:sld xmlns:a="http://schemas.openxmlformats.org/drawingml/2006/main" xmlns:r="http://schemas.openxmlformats.org/officeDocument/2006/relationships" xmlns:p="http://schemas.openxmlformats.org/presentationml/2006/main">
   <p:cSld>
@@ -3304,6 +4135,535 @@
               <a:rPr lang="es-ES" dirty="0" smtClean="0"/>
             </a:br>
             <a:endParaRPr lang="es-ES" dirty="0" smtClean="0"/>
+          </a:p>
+        </p:txBody>
+      </p:sp>
+    </p:spTree>
+  </p:cSld>
+  <p:clrMapOvr>
+    <a:masterClrMapping/>
+  </p:clrMapOvr>
+</p:sld>
+</file>
+
+<file path=ppt/slides/slide20.xml><?xml version="1.0" encoding="utf-8"?>
+<p:sld xmlns:a="http://schemas.openxmlformats.org/drawingml/2006/main" xmlns:r="http://schemas.openxmlformats.org/officeDocument/2006/relationships" xmlns:p="http://schemas.openxmlformats.org/presentationml/2006/main">
+  <p:cSld>
+    <p:spTree>
+      <p:nvGrpSpPr>
+        <p:cNvPr id="1" name=""/>
+        <p:cNvGrpSpPr/>
+        <p:nvPr/>
+      </p:nvGrpSpPr>
+      <p:grpSpPr>
+        <a:xfrm>
+          <a:off x="0" y="0"/>
+          <a:ext cx="0" cy="0"/>
+          <a:chOff x="0" y="0"/>
+          <a:chExt cx="0" cy="0"/>
+        </a:xfrm>
+      </p:grpSpPr>
+      <p:sp>
+        <p:nvSpPr>
+          <p:cNvPr id="2" name="1 Título"/>
+          <p:cNvSpPr>
+            <a:spLocks noGrp="1"/>
+          </p:cNvSpPr>
+          <p:nvPr>
+            <p:ph type="title"/>
+          </p:nvPr>
+        </p:nvSpPr>
+        <p:spPr/>
+        <p:txBody>
+          <a:bodyPr/>
+          <a:lstStyle/>
+          <a:p>
+            <a:r>
+              <a:rPr lang="es-ES" dirty="0" smtClean="0"/>
+              <a:t>ANEXO</a:t>
+            </a:r>
+            <a:endParaRPr lang="es-ES" dirty="0"/>
+          </a:p>
+        </p:txBody>
+      </p:sp>
+      <p:sp>
+        <p:nvSpPr>
+          <p:cNvPr id="3" name="2 Marcador de contenido"/>
+          <p:cNvSpPr>
+            <a:spLocks noGrp="1"/>
+          </p:cNvSpPr>
+          <p:nvPr>
+            <p:ph idx="1"/>
+          </p:nvPr>
+        </p:nvSpPr>
+        <p:spPr/>
+        <p:txBody>
+          <a:bodyPr anchor="ctr"/>
+          <a:lstStyle/>
+          <a:p>
+            <a:pPr algn="ctr">
+              <a:buNone/>
+            </a:pPr>
+            <a:r>
+              <a:rPr lang="es-ES" dirty="0" smtClean="0"/>
+              <a:t>Otros recursos e </a:t>
+            </a:r>
+            <a:r>
+              <a:rPr lang="es-ES" dirty="0" err="1" smtClean="0"/>
+              <a:t>info</a:t>
+            </a:r>
+            <a:r>
+              <a:rPr lang="es-ES" dirty="0" smtClean="0"/>
+              <a:t> necesaria.</a:t>
+            </a:r>
+            <a:endParaRPr lang="es-ES" dirty="0"/>
+          </a:p>
+        </p:txBody>
+      </p:sp>
+    </p:spTree>
+  </p:cSld>
+  <p:clrMapOvr>
+    <a:masterClrMapping/>
+  </p:clrMapOvr>
+</p:sld>
+</file>
+
+<file path=ppt/slides/slide21.xml><?xml version="1.0" encoding="utf-8"?>
+<p:sld xmlns:a="http://schemas.openxmlformats.org/drawingml/2006/main" xmlns:r="http://schemas.openxmlformats.org/officeDocument/2006/relationships" xmlns:p="http://schemas.openxmlformats.org/presentationml/2006/main">
+  <p:cSld>
+    <p:spTree>
+      <p:nvGrpSpPr>
+        <p:cNvPr id="1" name=""/>
+        <p:cNvGrpSpPr/>
+        <p:nvPr/>
+      </p:nvGrpSpPr>
+      <p:grpSpPr>
+        <a:xfrm>
+          <a:off x="0" y="0"/>
+          <a:ext cx="0" cy="0"/>
+          <a:chOff x="0" y="0"/>
+          <a:chExt cx="0" cy="0"/>
+        </a:xfrm>
+      </p:grpSpPr>
+      <p:sp>
+        <p:nvSpPr>
+          <p:cNvPr id="2" name="1 Título"/>
+          <p:cNvSpPr>
+            <a:spLocks noGrp="1"/>
+          </p:cNvSpPr>
+          <p:nvPr>
+            <p:ph type="title"/>
+          </p:nvPr>
+        </p:nvSpPr>
+        <p:spPr/>
+        <p:txBody>
+          <a:bodyPr/>
+          <a:lstStyle/>
+          <a:p>
+            <a:r>
+              <a:rPr lang="es-ES" dirty="0" smtClean="0"/>
+              <a:t>Usando GIT</a:t>
+            </a:r>
+            <a:endParaRPr lang="es-ES" dirty="0"/>
+          </a:p>
+        </p:txBody>
+      </p:sp>
+      <p:sp>
+        <p:nvSpPr>
+          <p:cNvPr id="3" name="2 Marcador de contenido"/>
+          <p:cNvSpPr>
+            <a:spLocks noGrp="1"/>
+          </p:cNvSpPr>
+          <p:nvPr>
+            <p:ph idx="1"/>
+          </p:nvPr>
+        </p:nvSpPr>
+        <p:spPr/>
+        <p:txBody>
+          <a:bodyPr/>
+          <a:lstStyle/>
+          <a:p>
+            <a:r>
+              <a:rPr lang="es-ES" dirty="0" smtClean="0"/>
+              <a:t>¿Qué es GIT?</a:t>
+            </a:r>
+          </a:p>
+          <a:p>
+            <a:r>
+              <a:rPr lang="es-ES" dirty="0" err="1" smtClean="0"/>
+              <a:t>Git</a:t>
+            </a:r>
+            <a:r>
+              <a:rPr lang="es-ES" dirty="0" smtClean="0"/>
+              <a:t> GUI vs GIT </a:t>
+            </a:r>
+            <a:r>
+              <a:rPr lang="es-ES" dirty="0" err="1" smtClean="0"/>
+              <a:t>Bash</a:t>
+            </a:r>
+            <a:endParaRPr lang="es-ES" dirty="0" smtClean="0"/>
+          </a:p>
+          <a:p>
+            <a:r>
+              <a:rPr lang="es-ES" dirty="0" err="1" smtClean="0"/>
+              <a:t>Git</a:t>
+            </a:r>
+            <a:r>
+              <a:rPr lang="es-ES" dirty="0" smtClean="0"/>
+              <a:t> vs </a:t>
+            </a:r>
+            <a:r>
+              <a:rPr lang="es-ES" dirty="0" err="1" smtClean="0"/>
+              <a:t>GitHUB</a:t>
+            </a:r>
+            <a:r>
+              <a:rPr lang="es-ES" dirty="0" smtClean="0"/>
+              <a:t>.</a:t>
+            </a:r>
+            <a:endParaRPr lang="es-ES" dirty="0"/>
+          </a:p>
+        </p:txBody>
+      </p:sp>
+    </p:spTree>
+  </p:cSld>
+  <p:clrMapOvr>
+    <a:masterClrMapping/>
+  </p:clrMapOvr>
+</p:sld>
+</file>
+
+<file path=ppt/slides/slide22.xml><?xml version="1.0" encoding="utf-8"?>
+<p:sld xmlns:a="http://schemas.openxmlformats.org/drawingml/2006/main" xmlns:r="http://schemas.openxmlformats.org/officeDocument/2006/relationships" xmlns:p="http://schemas.openxmlformats.org/presentationml/2006/main">
+  <p:cSld>
+    <p:spTree>
+      <p:nvGrpSpPr>
+        <p:cNvPr id="1" name=""/>
+        <p:cNvGrpSpPr/>
+        <p:nvPr/>
+      </p:nvGrpSpPr>
+      <p:grpSpPr>
+        <a:xfrm>
+          <a:off x="0" y="0"/>
+          <a:ext cx="0" cy="0"/>
+          <a:chOff x="0" y="0"/>
+          <a:chExt cx="0" cy="0"/>
+        </a:xfrm>
+      </p:grpSpPr>
+      <p:sp>
+        <p:nvSpPr>
+          <p:cNvPr id="2" name="1 Título"/>
+          <p:cNvSpPr>
+            <a:spLocks noGrp="1"/>
+          </p:cNvSpPr>
+          <p:nvPr>
+            <p:ph type="title"/>
+          </p:nvPr>
+        </p:nvSpPr>
+        <p:spPr/>
+        <p:txBody>
+          <a:bodyPr/>
+          <a:lstStyle/>
+          <a:p>
+            <a:r>
+              <a:rPr lang="es-ES" dirty="0" smtClean="0"/>
+              <a:t>Versiones de </a:t>
+            </a:r>
+            <a:r>
+              <a:rPr lang="es-ES" dirty="0" err="1" smtClean="0"/>
+              <a:t>Python</a:t>
+            </a:r>
+            <a:endParaRPr lang="es-ES" dirty="0"/>
+          </a:p>
+        </p:txBody>
+      </p:sp>
+      <p:sp>
+        <p:nvSpPr>
+          <p:cNvPr id="3" name="2 Marcador de contenido"/>
+          <p:cNvSpPr>
+            <a:spLocks noGrp="1"/>
+          </p:cNvSpPr>
+          <p:nvPr>
+            <p:ph idx="1"/>
+          </p:nvPr>
+        </p:nvSpPr>
+        <p:spPr/>
+        <p:txBody>
+          <a:bodyPr anchor="ctr"/>
+          <a:lstStyle/>
+          <a:p>
+            <a:pPr algn="ctr">
+              <a:buNone/>
+            </a:pPr>
+            <a:r>
+              <a:rPr lang="es-ES" dirty="0" smtClean="0"/>
+              <a:t>TD v099 usa </a:t>
+            </a:r>
+            <a:r>
+              <a:rPr lang="es-ES" dirty="0" err="1" smtClean="0"/>
+              <a:t>Python</a:t>
+            </a:r>
+            <a:r>
+              <a:rPr lang="es-ES" dirty="0" smtClean="0"/>
+              <a:t> v3.5.X</a:t>
+            </a:r>
+          </a:p>
+        </p:txBody>
+      </p:sp>
+    </p:spTree>
+  </p:cSld>
+  <p:clrMapOvr>
+    <a:masterClrMapping/>
+  </p:clrMapOvr>
+</p:sld>
+</file>
+
+<file path=ppt/slides/slide23.xml><?xml version="1.0" encoding="utf-8"?>
+<p:sld xmlns:a="http://schemas.openxmlformats.org/drawingml/2006/main" xmlns:r="http://schemas.openxmlformats.org/officeDocument/2006/relationships" xmlns:p="http://schemas.openxmlformats.org/presentationml/2006/main">
+  <p:cSld>
+    <p:spTree>
+      <p:nvGrpSpPr>
+        <p:cNvPr id="1" name=""/>
+        <p:cNvGrpSpPr/>
+        <p:nvPr/>
+      </p:nvGrpSpPr>
+      <p:grpSpPr>
+        <a:xfrm>
+          <a:off x="0" y="0"/>
+          <a:ext cx="0" cy="0"/>
+          <a:chOff x="0" y="0"/>
+          <a:chExt cx="0" cy="0"/>
+        </a:xfrm>
+      </p:grpSpPr>
+      <p:sp>
+        <p:nvSpPr>
+          <p:cNvPr id="2" name="1 Título"/>
+          <p:cNvSpPr>
+            <a:spLocks noGrp="1"/>
+          </p:cNvSpPr>
+          <p:nvPr>
+            <p:ph type="title"/>
+          </p:nvPr>
+        </p:nvSpPr>
+        <p:spPr/>
+        <p:txBody>
+          <a:bodyPr/>
+          <a:lstStyle/>
+          <a:p>
+            <a:r>
+              <a:rPr lang="es-ES" dirty="0" smtClean="0"/>
+              <a:t>¿Qué es PIP?</a:t>
+            </a:r>
+            <a:endParaRPr lang="es-ES" dirty="0"/>
+          </a:p>
+        </p:txBody>
+      </p:sp>
+      <p:sp>
+        <p:nvSpPr>
+          <p:cNvPr id="3" name="2 Marcador de contenido"/>
+          <p:cNvSpPr>
+            <a:spLocks noGrp="1"/>
+          </p:cNvSpPr>
+          <p:nvPr>
+            <p:ph idx="1"/>
+          </p:nvPr>
+        </p:nvSpPr>
+        <p:spPr/>
+        <p:txBody>
+          <a:bodyPr anchor="ctr"/>
+          <a:lstStyle/>
+          <a:p>
+            <a:pPr algn="ctr">
+              <a:buNone/>
+            </a:pPr>
+            <a:r>
+              <a:rPr lang="es-ES" dirty="0" smtClean="0"/>
+              <a:t>Gestor de paquetes para PYTHON. </a:t>
+            </a:r>
+          </a:p>
+          <a:p>
+            <a:pPr algn="ctr">
+              <a:buNone/>
+            </a:pPr>
+            <a:r>
+              <a:rPr lang="es-ES" dirty="0" smtClean="0"/>
+              <a:t>La mejor forma de instalar módulos.</a:t>
+            </a:r>
+          </a:p>
+          <a:p>
+            <a:pPr algn="ctr">
+              <a:buNone/>
+            </a:pPr>
+            <a:endParaRPr lang="es-ES" dirty="0" smtClean="0"/>
+          </a:p>
+          <a:p>
+            <a:pPr algn="ctr">
+              <a:buNone/>
+            </a:pPr>
+            <a:r>
+              <a:rPr lang="es-ES" dirty="0" smtClean="0"/>
+              <a:t>Añadir al </a:t>
+            </a:r>
+            <a:r>
+              <a:rPr lang="es-ES" dirty="0" err="1" smtClean="0"/>
+              <a:t>Path</a:t>
+            </a:r>
+            <a:r>
+              <a:rPr lang="es-ES" dirty="0" smtClean="0"/>
+              <a:t>:</a:t>
+            </a:r>
+          </a:p>
+          <a:p>
+            <a:pPr algn="ctr">
+              <a:buNone/>
+            </a:pPr>
+            <a:r>
+              <a:rPr lang="es-ES" sz="1800" dirty="0" smtClean="0"/>
+              <a:t>C:\</a:t>
+            </a:r>
+            <a:r>
+              <a:rPr lang="es-ES" sz="1800" dirty="0" smtClean="0"/>
+              <a:t>Users\USERNAME\AppDataLocal\Programs\Python\Python35\Scripts</a:t>
+            </a:r>
+          </a:p>
+          <a:p>
+            <a:pPr algn="ctr">
+              <a:buNone/>
+            </a:pPr>
+            <a:r>
+              <a:rPr lang="es-ES" sz="1800" dirty="0" smtClean="0"/>
+              <a:t>C:\</a:t>
+            </a:r>
+            <a:r>
+              <a:rPr lang="es-ES" sz="1800" dirty="0" smtClean="0"/>
+              <a:t>Users\USERNAME\AppDataLocal\Programs\Python\Python35</a:t>
+            </a:r>
+            <a:endParaRPr lang="es-ES" sz="1800" dirty="0"/>
+          </a:p>
+        </p:txBody>
+      </p:sp>
+    </p:spTree>
+  </p:cSld>
+  <p:clrMapOvr>
+    <a:masterClrMapping/>
+  </p:clrMapOvr>
+</p:sld>
+</file>
+
+<file path=ppt/slides/slide24.xml><?xml version="1.0" encoding="utf-8"?>
+<p:sld xmlns:a="http://schemas.openxmlformats.org/drawingml/2006/main" xmlns:r="http://schemas.openxmlformats.org/officeDocument/2006/relationships" xmlns:p="http://schemas.openxmlformats.org/presentationml/2006/main">
+  <p:cSld>
+    <p:spTree>
+      <p:nvGrpSpPr>
+        <p:cNvPr id="1" name=""/>
+        <p:cNvGrpSpPr/>
+        <p:nvPr/>
+      </p:nvGrpSpPr>
+      <p:grpSpPr>
+        <a:xfrm>
+          <a:off x="0" y="0"/>
+          <a:ext cx="0" cy="0"/>
+          <a:chOff x="0" y="0"/>
+          <a:chExt cx="0" cy="0"/>
+        </a:xfrm>
+      </p:grpSpPr>
+      <p:sp>
+        <p:nvSpPr>
+          <p:cNvPr id="2" name="1 Título"/>
+          <p:cNvSpPr>
+            <a:spLocks noGrp="1"/>
+          </p:cNvSpPr>
+          <p:nvPr>
+            <p:ph type="title"/>
+          </p:nvPr>
+        </p:nvSpPr>
+        <p:spPr/>
+        <p:txBody>
+          <a:bodyPr/>
+          <a:lstStyle/>
+          <a:p>
+            <a:r>
+              <a:rPr lang="es-ES" dirty="0" smtClean="0"/>
+              <a:t>Entornos Virtuales en </a:t>
+            </a:r>
+            <a:r>
+              <a:rPr lang="es-ES" dirty="0" err="1" smtClean="0"/>
+              <a:t>Python</a:t>
+            </a:r>
+            <a:endParaRPr lang="es-ES" dirty="0"/>
+          </a:p>
+        </p:txBody>
+      </p:sp>
+      <p:sp>
+        <p:nvSpPr>
+          <p:cNvPr id="3" name="2 Marcador de contenido"/>
+          <p:cNvSpPr>
+            <a:spLocks noGrp="1"/>
+          </p:cNvSpPr>
+          <p:nvPr>
+            <p:ph idx="1"/>
+          </p:nvPr>
+        </p:nvSpPr>
+        <p:spPr/>
+        <p:txBody>
+          <a:bodyPr anchor="ctr"/>
+          <a:lstStyle/>
+          <a:p>
+            <a:pPr algn="ctr">
+              <a:buNone/>
+            </a:pPr>
+            <a:r>
+              <a:rPr lang="es-ES" dirty="0" smtClean="0"/>
+              <a:t>¿Qué ocurre cuando tenemos distintos scripts que necesitan distintas versiones de ciertos módulos?</a:t>
+            </a:r>
+          </a:p>
+          <a:p>
+            <a:pPr algn="ctr">
+              <a:buNone/>
+            </a:pPr>
+            <a:r>
+              <a:rPr lang="es-ES" dirty="0" smtClean="0"/>
+              <a:t>Sufrimiento -&gt; Usa entornos virtuales</a:t>
+            </a:r>
+          </a:p>
+          <a:p>
+            <a:pPr algn="ctr">
+              <a:buNone/>
+            </a:pPr>
+            <a:r>
+              <a:rPr lang="es-ES" dirty="0" smtClean="0"/>
+              <a:t>¡¡SIEMPRE!!</a:t>
+            </a:r>
+            <a:endParaRPr lang="es-ES" dirty="0" smtClean="0"/>
+          </a:p>
+          <a:p>
+            <a:pPr algn="ctr">
+              <a:buNone/>
+            </a:pPr>
+            <a:r>
+              <a:rPr lang="es-ES" sz="1800" dirty="0" smtClean="0">
+                <a:hlinkClick r:id="rId2"/>
+              </a:rPr>
+              <a:t>http</a:t>
+            </a:r>
+            <a:r>
+              <a:rPr lang="es-ES" sz="1800" dirty="0" smtClean="0">
+                <a:hlinkClick r:id="rId2"/>
+              </a:rPr>
+              <a:t>://timmyreilly.azurewebsites.net/python-pip-virtualenv-installation-on-windows</a:t>
+            </a:r>
+            <a:r>
+              <a:rPr lang="es-ES" sz="1800" dirty="0" smtClean="0">
+                <a:hlinkClick r:id="rId2"/>
+              </a:rPr>
+              <a:t>/</a:t>
+            </a:r>
+            <a:endParaRPr lang="es-ES" sz="1800" dirty="0" smtClean="0"/>
+          </a:p>
+          <a:p>
+            <a:pPr algn="ctr">
+              <a:buNone/>
+            </a:pPr>
+            <a:endParaRPr lang="es-ES" sz="1800" dirty="0"/>
           </a:p>
         </p:txBody>
       </p:sp>
@@ -3408,11 +4768,7 @@
             </a:pPr>
             <a:r>
               <a:rPr lang="es-ES" dirty="0" smtClean="0"/>
-              <a:t>¿</a:t>
-            </a:r>
-            <a:r>
-              <a:rPr lang="es-ES" dirty="0" smtClean="0"/>
-              <a:t>Qué es </a:t>
+              <a:t>¿Qué es </a:t>
             </a:r>
             <a:r>
               <a:rPr lang="es-ES" dirty="0" err="1" smtClean="0"/>
@@ -3420,11 +4776,7 @@
             </a:r>
             <a:r>
               <a:rPr lang="es-ES" dirty="0" smtClean="0"/>
-              <a:t>? Historia y características (20 minutos</a:t>
-            </a:r>
-            <a:r>
-              <a:rPr lang="es-ES" dirty="0" smtClean="0"/>
-              <a:t>).</a:t>
+              <a:t>? Historia y características (20 minutos).</a:t>
             </a:r>
           </a:p>
           <a:p>
@@ -3444,7 +4796,6 @@
               <a:rPr lang="es-ES" dirty="0" smtClean="0"/>
               <a:t>.</a:t>
             </a:r>
-            <a:endParaRPr lang="es-ES" dirty="0" smtClean="0"/>
           </a:p>
           <a:p>
             <a:pPr marL="514350" indent="-514350">
@@ -3457,11 +4808,7 @@
             </a:r>
             <a:r>
               <a:rPr lang="es-ES" dirty="0" smtClean="0"/>
-              <a:t> </a:t>
-            </a:r>
-            <a:r>
-              <a:rPr lang="es-ES" dirty="0" smtClean="0"/>
-              <a:t>en los scripts TEXPORT/DAT. (45 minutos)</a:t>
+              <a:t> en los scripts TEXPORT/DAT. (45 minutos)</a:t>
             </a:r>
           </a:p>
           <a:p>
@@ -3471,11 +4818,7 @@
             </a:pPr>
             <a:r>
               <a:rPr lang="es-ES" dirty="0" smtClean="0"/>
-              <a:t>Fundamentos </a:t>
-            </a:r>
-            <a:r>
-              <a:rPr lang="es-ES" dirty="0" smtClean="0"/>
-              <a:t>de PYTHON: (5 horas)</a:t>
+              <a:t>Fundamentos de PYTHON: (5 horas)</a:t>
             </a:r>
             <a:br>
               <a:rPr lang="es-ES" dirty="0" smtClean="0"/>
@@ -3627,11 +4970,7 @@
             </a:pPr>
             <a:r>
               <a:rPr lang="es-ES" dirty="0" smtClean="0"/>
-              <a:t>Importando </a:t>
-            </a:r>
-            <a:r>
-              <a:rPr lang="es-ES" dirty="0" smtClean="0"/>
-              <a:t>módulos externos. (1 hora)</a:t>
+              <a:t>Importando módulos externos. (1 hora)</a:t>
             </a:r>
           </a:p>
           <a:p>
@@ -3648,11 +4987,7 @@
             </a:pPr>
             <a:r>
               <a:rPr lang="es-ES" dirty="0" smtClean="0"/>
-              <a:t>Mini-proyecto </a:t>
-            </a:r>
-            <a:r>
-              <a:rPr lang="es-ES" dirty="0" smtClean="0"/>
-              <a:t>final (45 minutos).</a:t>
+              <a:t>Mini-proyecto final (45 minutos).</a:t>
             </a:r>
           </a:p>
         </p:txBody>
@@ -3736,7 +5071,52 @@
           <a:bodyPr/>
           <a:lstStyle/>
           <a:p>
-            <a:endParaRPr lang="es-ES"/>
+            <a:r>
+              <a:rPr lang="es-ES" dirty="0" err="1" smtClean="0"/>
+              <a:t>Tscript</a:t>
+            </a:r>
+            <a:r>
+              <a:rPr lang="es-ES" dirty="0" smtClean="0"/>
+              <a:t> vs </a:t>
+            </a:r>
+            <a:r>
+              <a:rPr lang="es-ES" dirty="0" err="1" smtClean="0"/>
+              <a:t>Python</a:t>
+            </a:r>
+            <a:endParaRPr lang="es-ES" dirty="0" smtClean="0"/>
+          </a:p>
+          <a:p>
+            <a:r>
+              <a:rPr lang="es-ES" dirty="0" smtClean="0"/>
+              <a:t>¿Desde cuando?</a:t>
+            </a:r>
+          </a:p>
+          <a:p>
+            <a:r>
+              <a:rPr lang="es-ES" dirty="0" err="1" smtClean="0"/>
+              <a:t>PROs</a:t>
+            </a:r>
+            <a:r>
+              <a:rPr lang="es-ES" dirty="0" smtClean="0"/>
+              <a:t> y </a:t>
+            </a:r>
+            <a:r>
+              <a:rPr lang="es-ES" dirty="0" err="1" smtClean="0"/>
+              <a:t>CONs</a:t>
+            </a:r>
+            <a:r>
+              <a:rPr lang="es-ES" dirty="0" smtClean="0"/>
+              <a:t> de usar </a:t>
+            </a:r>
+            <a:r>
+              <a:rPr lang="es-ES" dirty="0" err="1" smtClean="0"/>
+              <a:t>Python</a:t>
+            </a:r>
+            <a:r>
+              <a:rPr lang="es-ES" dirty="0" smtClean="0"/>
+              <a:t> vs TD Puro.</a:t>
+            </a:r>
+            <a:endParaRPr lang="es-ES" dirty="0"/>
           </a:p>
         </p:txBody>
       </p:sp>
@@ -4063,19 +5443,7 @@
               <a:rPr lang="es-ES" dirty="0" smtClean="0">
                 <a:hlinkClick r:id="rId3"/>
               </a:rPr>
-              <a:t>http</a:t>
-            </a:r>
-            <a:r>
-              <a:rPr lang="es-ES" dirty="0" smtClean="0">
-                <a:hlinkClick r:id="rId3"/>
-              </a:rPr>
-              <a:t>://</a:t>
-            </a:r>
-            <a:r>
-              <a:rPr lang="es-ES" dirty="0" smtClean="0">
-                <a:hlinkClick r:id="rId3"/>
-              </a:rPr>
-              <a:t>www.derivative.ca/wiki099/index.php?title=Introduction_to_Python_Tutorial#Importing_Modules</a:t>
+              <a:t>http://www.derivative.ca/wiki099/index.php?title=Introduction_to_Python_Tutorial#Importing_Modules</a:t>
             </a:r>
             <a:endParaRPr lang="es-ES" dirty="0" smtClean="0"/>
           </a:p>
@@ -4115,15 +5483,304 @@
             </a:pPr>
             <a:r>
               <a:rPr lang="es-ES" dirty="0" smtClean="0"/>
-              <a:t>Por defecto: “C</a:t>
-            </a:r>
-            <a:r>
-              <a:rPr lang="es-ES" dirty="0" smtClean="0"/>
-              <a:t>:\</a:t>
-            </a:r>
-            <a:r>
-              <a:rPr lang="es-ES" dirty="0" smtClean="0"/>
-              <a:t>Users\USERNAME\AppData\Local\Programs\Python\Python35\Lib\site-packages”</a:t>
+              <a:t>Por defecto: “C:\Users\USERNAME\AppData\Local\Programs\Python\Python35\Lib\site-packages”</a:t>
+            </a:r>
+            <a:endParaRPr lang="es-ES" dirty="0"/>
+          </a:p>
+        </p:txBody>
+      </p:sp>
+    </p:spTree>
+  </p:cSld>
+  <p:clrMapOvr>
+    <a:masterClrMapping/>
+  </p:clrMapOvr>
+</p:sld>
+</file>
+
+<file path=ppt/slides/slide7.xml><?xml version="1.0" encoding="utf-8"?>
+<p:sld xmlns:a="http://schemas.openxmlformats.org/drawingml/2006/main" xmlns:r="http://schemas.openxmlformats.org/officeDocument/2006/relationships" xmlns:p="http://schemas.openxmlformats.org/presentationml/2006/main">
+  <p:cSld>
+    <p:spTree>
+      <p:nvGrpSpPr>
+        <p:cNvPr id="1" name=""/>
+        <p:cNvGrpSpPr/>
+        <p:nvPr/>
+      </p:nvGrpSpPr>
+      <p:grpSpPr>
+        <a:xfrm>
+          <a:off x="0" y="0"/>
+          <a:ext cx="0" cy="0"/>
+          <a:chOff x="0" y="0"/>
+          <a:chExt cx="0" cy="0"/>
+        </a:xfrm>
+      </p:grpSpPr>
+      <p:sp>
+        <p:nvSpPr>
+          <p:cNvPr id="2" name="1 Título"/>
+          <p:cNvSpPr>
+            <a:spLocks noGrp="1"/>
+          </p:cNvSpPr>
+          <p:nvPr>
+            <p:ph type="title"/>
+          </p:nvPr>
+        </p:nvSpPr>
+        <p:spPr/>
+        <p:txBody>
+          <a:bodyPr>
+            <a:normAutofit/>
+          </a:bodyPr>
+          <a:lstStyle/>
+          <a:p>
+            <a:r>
+              <a:rPr lang="es-ES" dirty="0" smtClean="0"/>
+              <a:t>Ejecutar </a:t>
+            </a:r>
+            <a:r>
+              <a:rPr lang="es-ES" dirty="0" err="1" smtClean="0"/>
+              <a:t>Python</a:t>
+            </a:r>
+            <a:r>
+              <a:rPr lang="es-ES" dirty="0" smtClean="0"/>
+              <a:t> Stand-</a:t>
+            </a:r>
+            <a:r>
+              <a:rPr lang="es-ES" dirty="0" err="1" smtClean="0"/>
+              <a:t>Alone</a:t>
+            </a:r>
+            <a:endParaRPr lang="es-ES" dirty="0"/>
+          </a:p>
+        </p:txBody>
+      </p:sp>
+      <p:sp>
+        <p:nvSpPr>
+          <p:cNvPr id="3" name="2 Marcador de contenido"/>
+          <p:cNvSpPr>
+            <a:spLocks noGrp="1"/>
+          </p:cNvSpPr>
+          <p:nvPr>
+            <p:ph idx="1"/>
+          </p:nvPr>
+        </p:nvSpPr>
+        <p:spPr/>
+        <p:txBody>
+          <a:bodyPr/>
+          <a:lstStyle/>
+          <a:p>
+            <a:r>
+              <a:rPr lang="es-ES" dirty="0" smtClean="0"/>
+              <a:t>Levantar un entorno de desarrollo cómodo.</a:t>
+            </a:r>
+          </a:p>
+          <a:p>
+            <a:r>
+              <a:rPr lang="es-ES" dirty="0" smtClean="0"/>
+              <a:t>¿Cómo desarrollar y publicar </a:t>
+            </a:r>
+            <a:r>
+              <a:rPr lang="es-ES" dirty="0" err="1" smtClean="0"/>
+              <a:t>Python</a:t>
+            </a:r>
+            <a:r>
+              <a:rPr lang="es-ES" dirty="0" smtClean="0"/>
+              <a:t>?</a:t>
+            </a:r>
+          </a:p>
+          <a:p>
+            <a:r>
+              <a:rPr lang="es-ES" dirty="0" smtClean="0"/>
+              <a:t>Recursos disponibles.</a:t>
+            </a:r>
+            <a:endParaRPr lang="es-ES" dirty="0"/>
+          </a:p>
+        </p:txBody>
+      </p:sp>
+    </p:spTree>
+  </p:cSld>
+  <p:clrMapOvr>
+    <a:masterClrMapping/>
+  </p:clrMapOvr>
+</p:sld>
+</file>
+
+<file path=ppt/slides/slide8.xml><?xml version="1.0" encoding="utf-8"?>
+<p:sld xmlns:a="http://schemas.openxmlformats.org/drawingml/2006/main" xmlns:r="http://schemas.openxmlformats.org/officeDocument/2006/relationships" xmlns:p="http://schemas.openxmlformats.org/presentationml/2006/main">
+  <p:cSld>
+    <p:spTree>
+      <p:nvGrpSpPr>
+        <p:cNvPr id="1" name=""/>
+        <p:cNvGrpSpPr/>
+        <p:nvPr/>
+      </p:nvGrpSpPr>
+      <p:grpSpPr>
+        <a:xfrm>
+          <a:off x="0" y="0"/>
+          <a:ext cx="0" cy="0"/>
+          <a:chOff x="0" y="0"/>
+          <a:chExt cx="0" cy="0"/>
+        </a:xfrm>
+      </p:grpSpPr>
+      <p:sp>
+        <p:nvSpPr>
+          <p:cNvPr id="2" name="1 Título"/>
+          <p:cNvSpPr>
+            <a:spLocks noGrp="1"/>
+          </p:cNvSpPr>
+          <p:nvPr>
+            <p:ph type="title"/>
+          </p:nvPr>
+        </p:nvSpPr>
+        <p:spPr/>
+        <p:txBody>
+          <a:bodyPr/>
+          <a:lstStyle/>
+          <a:p>
+            <a:r>
+              <a:rPr lang="es-ES" dirty="0" err="1" smtClean="0"/>
+              <a:t>Python</a:t>
+            </a:r>
+            <a:r>
+              <a:rPr lang="es-ES" dirty="0" smtClean="0"/>
+              <a:t> en TD</a:t>
+            </a:r>
+            <a:endParaRPr lang="es-ES" dirty="0"/>
+          </a:p>
+        </p:txBody>
+      </p:sp>
+      <p:sp>
+        <p:nvSpPr>
+          <p:cNvPr id="3" name="2 Marcador de contenido"/>
+          <p:cNvSpPr>
+            <a:spLocks noGrp="1"/>
+          </p:cNvSpPr>
+          <p:nvPr>
+            <p:ph idx="1"/>
+          </p:nvPr>
+        </p:nvSpPr>
+        <p:spPr/>
+        <p:txBody>
+          <a:bodyPr/>
+          <a:lstStyle/>
+          <a:p>
+            <a:r>
+              <a:rPr lang="es-ES" dirty="0" err="1" smtClean="0"/>
+              <a:t>Embedded</a:t>
+            </a:r>
+            <a:r>
+              <a:rPr lang="es-ES" dirty="0" smtClean="0"/>
+              <a:t> vs Local (Pros &amp; </a:t>
+            </a:r>
+            <a:r>
+              <a:rPr lang="es-ES" dirty="0" err="1" smtClean="0"/>
+              <a:t>Cons</a:t>
+            </a:r>
+            <a:r>
+              <a:rPr lang="es-ES" dirty="0" smtClean="0"/>
+              <a:t>).</a:t>
+            </a:r>
+          </a:p>
+          <a:p>
+            <a:r>
+              <a:rPr lang="es-ES" dirty="0" err="1" smtClean="0"/>
+              <a:t>Python</a:t>
+            </a:r>
+            <a:r>
+              <a:rPr lang="es-ES" dirty="0" smtClean="0"/>
+              <a:t> en un DAT.</a:t>
+            </a:r>
+          </a:p>
+          <a:p>
+            <a:r>
+              <a:rPr lang="es-ES" dirty="0" smtClean="0"/>
+              <a:t>Consola en </a:t>
+            </a:r>
+            <a:r>
+              <a:rPr lang="es-ES" dirty="0" err="1" smtClean="0"/>
+              <a:t>TextPort</a:t>
+            </a:r>
+            <a:r>
+              <a:rPr lang="es-ES" dirty="0" smtClean="0"/>
+              <a:t>.</a:t>
+            </a:r>
+            <a:endParaRPr lang="es-ES" dirty="0"/>
+          </a:p>
+        </p:txBody>
+      </p:sp>
+    </p:spTree>
+  </p:cSld>
+  <p:clrMapOvr>
+    <a:masterClrMapping/>
+  </p:clrMapOvr>
+</p:sld>
+</file>
+
+<file path=ppt/slides/slide9.xml><?xml version="1.0" encoding="utf-8"?>
+<p:sld xmlns:a="http://schemas.openxmlformats.org/drawingml/2006/main" xmlns:r="http://schemas.openxmlformats.org/officeDocument/2006/relationships" xmlns:p="http://schemas.openxmlformats.org/presentationml/2006/main">
+  <p:cSld>
+    <p:spTree>
+      <p:nvGrpSpPr>
+        <p:cNvPr id="1" name=""/>
+        <p:cNvGrpSpPr/>
+        <p:nvPr/>
+      </p:nvGrpSpPr>
+      <p:grpSpPr>
+        <a:xfrm>
+          <a:off x="0" y="0"/>
+          <a:ext cx="0" cy="0"/>
+          <a:chOff x="0" y="0"/>
+          <a:chExt cx="0" cy="0"/>
+        </a:xfrm>
+      </p:grpSpPr>
+      <p:sp>
+        <p:nvSpPr>
+          <p:cNvPr id="2" name="1 Título"/>
+          <p:cNvSpPr>
+            <a:spLocks noGrp="1"/>
+          </p:cNvSpPr>
+          <p:nvPr>
+            <p:ph type="title"/>
+          </p:nvPr>
+        </p:nvSpPr>
+        <p:spPr/>
+        <p:txBody>
+          <a:bodyPr/>
+          <a:lstStyle/>
+          <a:p>
+            <a:r>
+              <a:rPr lang="es-ES" dirty="0" smtClean="0"/>
+              <a:t>Fundamentos de </a:t>
+            </a:r>
+            <a:r>
+              <a:rPr lang="es-ES" dirty="0" err="1" smtClean="0"/>
+              <a:t>Python</a:t>
+            </a:r>
+            <a:endParaRPr lang="es-ES" dirty="0"/>
+          </a:p>
+        </p:txBody>
+      </p:sp>
+      <p:sp>
+        <p:nvSpPr>
+          <p:cNvPr id="3" name="2 Marcador de contenido"/>
+          <p:cNvSpPr>
+            <a:spLocks noGrp="1"/>
+          </p:cNvSpPr>
+          <p:nvPr>
+            <p:ph idx="1"/>
+          </p:nvPr>
+        </p:nvSpPr>
+        <p:spPr/>
+        <p:txBody>
+          <a:bodyPr/>
+          <a:lstStyle/>
+          <a:p>
+            <a:r>
+              <a:rPr lang="es-ES" dirty="0" smtClean="0"/>
+              <a:t>Variables</a:t>
+            </a:r>
+          </a:p>
+          <a:p>
+            <a:r>
+              <a:rPr lang="es-ES" dirty="0" smtClean="0"/>
+              <a:t>Constantes</a:t>
             </a:r>
             <a:endParaRPr lang="es-ES" dirty="0"/>
           </a:p>

</xml_diff>